<commit_message>
Correcting typo in ppt file
</commit_message>
<xml_diff>
--- a/NYPD_Slid.pptx
+++ b/NYPD_Slid.pptx
@@ -112,6 +112,11 @@
       </a:defRPr>
     </a:lvl9pPr>
   </p:defaultTextStyle>
+  <p:extLst>
+    <p:ext uri="{EFAFB233-063F-42B5-8137-9DF3F51BA10A}">
+      <p15:sldGuideLst xmlns:p15="http://schemas.microsoft.com/office/powerpoint/2012/main"/>
+    </p:ext>
+  </p:extLst>
 </p:presentation>
 </file>
 
@@ -285,7 +290,7 @@
             <a:fld id="{87DE6118-2437-4B30-8E3C-4D2BE6020583}" type="datetimeFigureOut">
               <a:rPr lang="en-US" dirty="0"/>
               <a:pPr/>
-              <a:t>5/30/21</a:t>
+              <a:t>6/24/21</a:t>
             </a:fld>
             <a:endParaRPr lang="en-US" dirty="0"/>
           </a:p>
@@ -611,7 +616,7 @@
           <a:p>
             <a:fld id="{87DE6118-2437-4B30-8E3C-4D2BE6020583}" type="datetimeFigureOut">
               <a:rPr lang="en-US" dirty="0"/>
-              <a:t>5/30/21</a:t>
+              <a:t>6/24/21</a:t>
             </a:fld>
             <a:endParaRPr lang="en-US" dirty="0"/>
           </a:p>
@@ -786,7 +791,7 @@
           <a:p>
             <a:fld id="{87DE6118-2437-4B30-8E3C-4D2BE6020583}" type="datetimeFigureOut">
               <a:rPr lang="en-US" dirty="0"/>
-              <a:t>5/30/21</a:t>
+              <a:t>6/24/21</a:t>
             </a:fld>
             <a:endParaRPr lang="en-US" dirty="0"/>
           </a:p>
@@ -951,7 +956,7 @@
           <a:p>
             <a:fld id="{87DE6118-2437-4B30-8E3C-4D2BE6020583}" type="datetimeFigureOut">
               <a:rPr lang="en-US" dirty="0"/>
-              <a:t>5/30/21</a:t>
+              <a:t>6/24/21</a:t>
             </a:fld>
             <a:endParaRPr lang="en-US" dirty="0"/>
           </a:p>
@@ -1224,7 +1229,7 @@
             <a:fld id="{87DE6118-2437-4B30-8E3C-4D2BE6020583}" type="datetimeFigureOut">
               <a:rPr lang="en-US" dirty="0"/>
               <a:pPr/>
-              <a:t>5/30/21</a:t>
+              <a:t>6/24/21</a:t>
             </a:fld>
             <a:endParaRPr lang="en-US" dirty="0"/>
           </a:p>
@@ -1614,7 +1619,7 @@
           <a:p>
             <a:fld id="{87DE6118-2437-4B30-8E3C-4D2BE6020583}" type="datetimeFigureOut">
               <a:rPr lang="en-US" dirty="0"/>
-              <a:t>5/30/21</a:t>
+              <a:t>6/24/21</a:t>
             </a:fld>
             <a:endParaRPr lang="en-US" dirty="0"/>
           </a:p>
@@ -2086,7 +2091,7 @@
           <a:p>
             <a:fld id="{87DE6118-2437-4B30-8E3C-4D2BE6020583}" type="datetimeFigureOut">
               <a:rPr lang="en-US" dirty="0"/>
-              <a:t>5/30/21</a:t>
+              <a:t>6/24/21</a:t>
             </a:fld>
             <a:endParaRPr lang="en-US" dirty="0"/>
           </a:p>
@@ -2199,7 +2204,7 @@
           <a:p>
             <a:fld id="{87DE6118-2437-4B30-8E3C-4D2BE6020583}" type="datetimeFigureOut">
               <a:rPr lang="en-US" dirty="0"/>
-              <a:t>5/30/21</a:t>
+              <a:t>6/24/21</a:t>
             </a:fld>
             <a:endParaRPr lang="en-US" dirty="0"/>
           </a:p>
@@ -2289,7 +2294,7 @@
           <a:p>
             <a:fld id="{87DE6118-2437-4B30-8E3C-4D2BE6020583}" type="datetimeFigureOut">
               <a:rPr lang="en-US" dirty="0"/>
-              <a:t>5/30/21</a:t>
+              <a:t>6/24/21</a:t>
             </a:fld>
             <a:endParaRPr lang="en-US" dirty="0"/>
           </a:p>
@@ -2631,7 +2636,7 @@
             <a:fld id="{87DE6118-2437-4B30-8E3C-4D2BE6020583}" type="datetimeFigureOut">
               <a:rPr lang="en-US" dirty="0"/>
               <a:pPr/>
-              <a:t>5/30/21</a:t>
+              <a:t>6/24/21</a:t>
             </a:fld>
             <a:endParaRPr lang="en-US" dirty="0"/>
           </a:p>
@@ -3016,7 +3021,7 @@
             <a:fld id="{87DE6118-2437-4B30-8E3C-4D2BE6020583}" type="datetimeFigureOut">
               <a:rPr lang="en-US" dirty="0"/>
               <a:pPr/>
-              <a:t>5/30/21</a:t>
+              <a:t>6/24/21</a:t>
             </a:fld>
             <a:endParaRPr lang="en-US" dirty="0"/>
           </a:p>
@@ -3291,7 +3296,7 @@
             <a:fld id="{87DE6118-2437-4B30-8E3C-4D2BE6020583}" type="datetimeFigureOut">
               <a:rPr lang="en-US" dirty="0"/>
               <a:pPr/>
-              <a:t>5/30/21</a:t>
+              <a:t>6/24/21</a:t>
             </a:fld>
             <a:endParaRPr lang="en-US" dirty="0"/>
           </a:p>
@@ -3852,7 +3857,7 @@
           <a:p>
             <a:r>
               <a:rPr lang="en-US" dirty="0"/>
-              <a:t>Created by Chirayu Parikh</a:t>
+              <a:t>Created by CU Student</a:t>
             </a:r>
             <a:br>
               <a:rPr lang="en-US" dirty="0"/>
@@ -3866,7 +3871,7 @@
             </a:br>
             <a:r>
               <a:rPr lang="en-US" dirty="0"/>
-              <a:t>Data Science (DTSA 5301) Assignment</a:t>
+              <a:t>Data Science (DTSA 5301) Assignment. </a:t>
             </a:r>
           </a:p>
         </p:txBody>
@@ -4131,13 +4136,8 @@
             </a:pPr>
             <a:r>
               <a:rPr lang="en-US" dirty="0"/>
-              <a:t>Brooklyn has the highest number of incidents follows by </a:t>
-            </a:r>
-            <a:r>
-              <a:rPr lang="en-US" dirty="0" err="1"/>
-              <a:t>Bornx</a:t>
-            </a:r>
-            <a:endParaRPr lang="en-US" dirty="0"/>
+              <a:t>Brooklyn has the highest number of incidents follows by Bronx</a:t>
+            </a:r>
           </a:p>
           <a:p>
             <a:pPr marL="285750" indent="-285750">
@@ -4408,15 +4408,7 @@
             </a:pPr>
             <a:r>
               <a:rPr lang="en-US" dirty="0"/>
-              <a:t>A close look at monthly number per year shows June, July and August had the </a:t>
-            </a:r>
-            <a:r>
-              <a:rPr lang="en-US" dirty="0" err="1"/>
-              <a:t>higest</a:t>
-            </a:r>
-            <a:r>
-              <a:rPr lang="en-US" dirty="0"/>
-              <a:t> number of incidents</a:t>
+              <a:t>A close look at monthly number per year shows June, July and August had the highest number of incidents</a:t>
             </a:r>
           </a:p>
           <a:p>
@@ -4426,15 +4418,7 @@
             </a:pPr>
             <a:r>
               <a:rPr lang="en-US" dirty="0"/>
-              <a:t>This possibly co-insides with the killing of </a:t>
-            </a:r>
-            <a:r>
-              <a:rPr lang="en-US" dirty="0" err="1"/>
-              <a:t>Geroge</a:t>
-            </a:r>
-            <a:r>
-              <a:rPr lang="en-US" dirty="0"/>
-              <a:t> Floyd and the riots that followed in the aftermath</a:t>
+              <a:t>This possibly co-insides with the killing of George Floyd and the riots that followed in the aftermath</a:t>
             </a:r>
           </a:p>
         </p:txBody>
@@ -4813,15 +4797,7 @@
           <a:p>
             <a:r>
               <a:rPr lang="en-US" dirty="0"/>
-              <a:t>This needs to be combined with other datasets (i.e. socio-economic, </a:t>
-            </a:r>
-            <a:r>
-              <a:rPr lang="en-US" dirty="0" err="1"/>
-              <a:t>etc</a:t>
-            </a:r>
-            <a:r>
-              <a:rPr lang="en-US" dirty="0"/>
-              <a:t>) to get specific trends and patterns on shootings</a:t>
+              <a:t>This needs to be combined with other datasets (i.e. socio-economic, etc.) to get specific trends and patterns on shootings</a:t>
             </a:r>
           </a:p>
           <a:p>

</xml_diff>